<commit_message>
More work to TreeNode and TreeView. Working well now.
</commit_message>
<xml_diff>
--- a/Docs/EditorsLayout.pptx
+++ b/Docs/EditorsLayout.pptx
@@ -104,6 +104,11 @@
       </a:defRPr>
     </a:lvl9pPr>
   </p:defaultTextStyle>
+  <p:extLst>
+    <p:ext uri="{EFAFB233-063F-42B5-8137-9DF3F51BA10A}">
+      <p15:sldGuideLst xmlns:p15="http://schemas.microsoft.com/office/powerpoint/2012/main"/>
+    </p:ext>
+  </p:extLst>
 </p:presentation>
 </file>
 
@@ -238,7 +243,7 @@
           <a:p>
             <a:fld id="{8184A1B7-FB6F-42C7-BE59-14B61E1EA539}" type="datetimeFigureOut">
               <a:rPr lang="en-US" smtClean="0"/>
-              <a:t>1/12/2014</a:t>
+              <a:t>1/14/2014</a:t>
             </a:fld>
             <a:endParaRPr lang="en-US"/>
           </a:p>
@@ -408,7 +413,7 @@
           <a:p>
             <a:fld id="{8184A1B7-FB6F-42C7-BE59-14B61E1EA539}" type="datetimeFigureOut">
               <a:rPr lang="en-US" smtClean="0"/>
-              <a:t>1/12/2014</a:t>
+              <a:t>1/14/2014</a:t>
             </a:fld>
             <a:endParaRPr lang="en-US"/>
           </a:p>
@@ -588,7 +593,7 @@
           <a:p>
             <a:fld id="{8184A1B7-FB6F-42C7-BE59-14B61E1EA539}" type="datetimeFigureOut">
               <a:rPr lang="en-US" smtClean="0"/>
-              <a:t>1/12/2014</a:t>
+              <a:t>1/14/2014</a:t>
             </a:fld>
             <a:endParaRPr lang="en-US"/>
           </a:p>
@@ -758,7 +763,7 @@
           <a:p>
             <a:fld id="{8184A1B7-FB6F-42C7-BE59-14B61E1EA539}" type="datetimeFigureOut">
               <a:rPr lang="en-US" smtClean="0"/>
-              <a:t>1/12/2014</a:t>
+              <a:t>1/14/2014</a:t>
             </a:fld>
             <a:endParaRPr lang="en-US"/>
           </a:p>
@@ -1004,7 +1009,7 @@
           <a:p>
             <a:fld id="{8184A1B7-FB6F-42C7-BE59-14B61E1EA539}" type="datetimeFigureOut">
               <a:rPr lang="en-US" smtClean="0"/>
-              <a:t>1/12/2014</a:t>
+              <a:t>1/14/2014</a:t>
             </a:fld>
             <a:endParaRPr lang="en-US"/>
           </a:p>
@@ -1236,7 +1241,7 @@
           <a:p>
             <a:fld id="{8184A1B7-FB6F-42C7-BE59-14B61E1EA539}" type="datetimeFigureOut">
               <a:rPr lang="en-US" smtClean="0"/>
-              <a:t>1/12/2014</a:t>
+              <a:t>1/14/2014</a:t>
             </a:fld>
             <a:endParaRPr lang="en-US"/>
           </a:p>
@@ -1603,7 +1608,7 @@
           <a:p>
             <a:fld id="{8184A1B7-FB6F-42C7-BE59-14B61E1EA539}" type="datetimeFigureOut">
               <a:rPr lang="en-US" smtClean="0"/>
-              <a:t>1/12/2014</a:t>
+              <a:t>1/14/2014</a:t>
             </a:fld>
             <a:endParaRPr lang="en-US"/>
           </a:p>
@@ -1721,7 +1726,7 @@
           <a:p>
             <a:fld id="{8184A1B7-FB6F-42C7-BE59-14B61E1EA539}" type="datetimeFigureOut">
               <a:rPr lang="en-US" smtClean="0"/>
-              <a:t>1/12/2014</a:t>
+              <a:t>1/14/2014</a:t>
             </a:fld>
             <a:endParaRPr lang="en-US"/>
           </a:p>
@@ -1816,7 +1821,7 @@
           <a:p>
             <a:fld id="{8184A1B7-FB6F-42C7-BE59-14B61E1EA539}" type="datetimeFigureOut">
               <a:rPr lang="en-US" smtClean="0"/>
-              <a:t>1/12/2014</a:t>
+              <a:t>1/14/2014</a:t>
             </a:fld>
             <a:endParaRPr lang="en-US"/>
           </a:p>
@@ -2093,7 +2098,7 @@
           <a:p>
             <a:fld id="{8184A1B7-FB6F-42C7-BE59-14B61E1EA539}" type="datetimeFigureOut">
               <a:rPr lang="en-US" smtClean="0"/>
-              <a:t>1/12/2014</a:t>
+              <a:t>1/14/2014</a:t>
             </a:fld>
             <a:endParaRPr lang="en-US"/>
           </a:p>
@@ -2346,7 +2351,7 @@
           <a:p>
             <a:fld id="{8184A1B7-FB6F-42C7-BE59-14B61E1EA539}" type="datetimeFigureOut">
               <a:rPr lang="en-US" smtClean="0"/>
-              <a:t>1/12/2014</a:t>
+              <a:t>1/14/2014</a:t>
             </a:fld>
             <a:endParaRPr lang="en-US"/>
           </a:p>
@@ -2559,7 +2564,7 @@
           <a:p>
             <a:fld id="{8184A1B7-FB6F-42C7-BE59-14B61E1EA539}" type="datetimeFigureOut">
               <a:rPr lang="en-US" smtClean="0"/>
-              <a:t>1/12/2014</a:t>
+              <a:t>1/14/2014</a:t>
             </a:fld>
             <a:endParaRPr lang="en-US"/>
           </a:p>
@@ -3240,139 +3245,11 @@
           <a:lstStyle/>
           <a:p>
             <a:pPr algn="ctr"/>
-            <a:r>
-              <a:rPr lang="en-US" dirty="0" smtClean="0">
-                <a:solidFill>
-                  <a:schemeClr val="tx1"/>
-                </a:solidFill>
-              </a:rPr>
-              <a:t>Files</a:t>
-            </a:r>
             <a:endParaRPr lang="en-US" dirty="0">
               <a:solidFill>
                 <a:schemeClr val="tx1"/>
               </a:solidFill>
             </a:endParaRPr>
-          </a:p>
-        </p:txBody>
-      </p:sp>
-      <p:sp>
-        <p:nvSpPr>
-          <p:cNvPr id="11" name="TextBox 10"/>
-          <p:cNvSpPr txBox="1"/>
-          <p:nvPr/>
-        </p:nvSpPr>
-        <p:spPr>
-          <a:xfrm>
-            <a:off x="1195168" y="1218928"/>
-            <a:ext cx="1546385" cy="1938992"/>
-          </a:xfrm>
-          <a:prstGeom prst="rect">
-            <a:avLst/>
-          </a:prstGeom>
-          <a:noFill/>
-        </p:spPr>
-        <p:txBody>
-          <a:bodyPr wrap="none" rtlCol="0">
-            <a:spAutoFit/>
-          </a:bodyPr>
-          <a:lstStyle/>
-          <a:p>
-            <a:r>
-              <a:rPr lang="en-US" sz="1200" b="1" dirty="0" smtClean="0"/>
-              <a:t>Textures:</a:t>
-            </a:r>
-          </a:p>
-          <a:p>
-            <a:pPr marL="171450" indent="-171450">
-              <a:buFont typeface="Arial" panose="020B0604020202020204" pitchFamily="34" charset="0"/>
-              <a:buChar char="•"/>
-            </a:pPr>
-            <a:r>
-              <a:rPr lang="en-US" sz="1200" dirty="0" smtClean="0"/>
-              <a:t>Buildings</a:t>
-            </a:r>
-          </a:p>
-          <a:p>
-            <a:pPr marL="628650" lvl="1" indent="-171450">
-              <a:buFont typeface="Arial" panose="020B0604020202020204" pitchFamily="34" charset="0"/>
-              <a:buChar char="•"/>
-            </a:pPr>
-            <a:r>
-              <a:rPr lang="en-US" sz="1200" dirty="0" smtClean="0"/>
-              <a:t>Concrete</a:t>
-            </a:r>
-          </a:p>
-          <a:p>
-            <a:pPr marL="628650" lvl="1" indent="-171450">
-              <a:buFont typeface="Arial" panose="020B0604020202020204" pitchFamily="34" charset="0"/>
-              <a:buChar char="•"/>
-            </a:pPr>
-            <a:r>
-              <a:rPr lang="en-US" sz="1200" dirty="0" smtClean="0"/>
-              <a:t>Wood</a:t>
-            </a:r>
-          </a:p>
-          <a:p>
-            <a:pPr marL="628650" lvl="1" indent="-171450">
-              <a:buFont typeface="Arial" panose="020B0604020202020204" pitchFamily="34" charset="0"/>
-              <a:buChar char="•"/>
-            </a:pPr>
-            <a:r>
-              <a:rPr lang="en-US" sz="1200" dirty="0" smtClean="0"/>
-              <a:t>Carpet</a:t>
-            </a:r>
-          </a:p>
-          <a:p>
-            <a:pPr marL="628650" lvl="1" indent="-171450">
-              <a:buFont typeface="Arial" panose="020B0604020202020204" pitchFamily="34" charset="0"/>
-              <a:buChar char="•"/>
-            </a:pPr>
-            <a:r>
-              <a:rPr lang="en-US" sz="1200" dirty="0" smtClean="0"/>
-              <a:t>Carpet_Nor</a:t>
-            </a:r>
-          </a:p>
-          <a:p>
-            <a:pPr marL="171450" indent="-171450">
-              <a:buFont typeface="Arial" panose="020B0604020202020204" pitchFamily="34" charset="0"/>
-              <a:buChar char="•"/>
-            </a:pPr>
-            <a:r>
-              <a:rPr lang="en-US" sz="1200" dirty="0" smtClean="0"/>
-              <a:t>Vehicles</a:t>
-            </a:r>
-          </a:p>
-          <a:p>
-            <a:pPr marL="628650" lvl="1" indent="-171450">
-              <a:buFont typeface="Arial" panose="020B0604020202020204" pitchFamily="34" charset="0"/>
-              <a:buChar char="•"/>
-            </a:pPr>
-            <a:r>
-              <a:rPr lang="en-US" sz="1200" dirty="0" smtClean="0"/>
-              <a:t>Metal</a:t>
-            </a:r>
-          </a:p>
-          <a:p>
-            <a:pPr marL="628650" lvl="1" indent="-171450">
-              <a:buFont typeface="Arial" panose="020B0604020202020204" pitchFamily="34" charset="0"/>
-              <a:buChar char="•"/>
-            </a:pPr>
-            <a:r>
-              <a:rPr lang="en-US" sz="1200" dirty="0" smtClean="0"/>
-              <a:t>Tire</a:t>
-            </a:r>
-          </a:p>
-          <a:p>
-            <a:pPr marL="628650" lvl="1" indent="-171450">
-              <a:buFont typeface="Arial" panose="020B0604020202020204" pitchFamily="34" charset="0"/>
-              <a:buChar char="•"/>
-            </a:pPr>
-            <a:r>
-              <a:rPr lang="en-US" sz="1200" dirty="0" smtClean="0"/>
-              <a:t>Hood</a:t>
-            </a:r>
-            <a:endParaRPr lang="en-US" sz="1200" dirty="0"/>
           </a:p>
         </p:txBody>
       </p:sp>
@@ -3443,264 +3320,6 @@
           </a:prstGeom>
         </p:spPr>
       </p:pic>
-      <p:pic>
-        <p:nvPicPr>
-          <p:cNvPr id="29" name="Picture 28"/>
-          <p:cNvPicPr>
-            <a:picLocks noChangeAspect="1"/>
-          </p:cNvPicPr>
-          <p:nvPr/>
-        </p:nvPicPr>
-        <p:blipFill rotWithShape="1">
-          <a:blip r:embed="rId2"/>
-          <a:srcRect l="17013" t="25820" r="70374" b="41862"/>
-          <a:stretch/>
-        </p:blipFill>
-        <p:spPr>
-          <a:xfrm>
-            <a:off x="2921396" y="3458410"/>
-            <a:ext cx="1097393" cy="937204"/>
-          </a:xfrm>
-          <a:prstGeom prst="snip2DiagRect">
-            <a:avLst/>
-          </a:prstGeom>
-          <a:solidFill>
-            <a:schemeClr val="bg1"/>
-          </a:solidFill>
-          <a:ln w="88900" cap="sq">
-            <a:solidFill>
-              <a:srgbClr val="FFFFFF"/>
-            </a:solidFill>
-            <a:miter lim="800000"/>
-          </a:ln>
-          <a:effectLst>
-            <a:outerShdw blurRad="88900" algn="tl" rotWithShape="0">
-              <a:srgbClr val="000000">
-                <a:alpha val="45000"/>
-              </a:srgbClr>
-            </a:outerShdw>
-          </a:effectLst>
-          <a:scene3d>
-            <a:camera prst="orthographicFront"/>
-            <a:lightRig rig="twoPt" dir="t">
-              <a:rot lat="0" lon="0" rev="7200000"/>
-            </a:lightRig>
-          </a:scene3d>
-          <a:sp3d>
-            <a:bevelT w="25400" h="19050"/>
-            <a:contourClr>
-              <a:srgbClr val="FFFFFF"/>
-            </a:contourClr>
-          </a:sp3d>
-        </p:spPr>
-      </p:pic>
-      <p:pic>
-        <p:nvPicPr>
-          <p:cNvPr id="30" name="Picture 29"/>
-          <p:cNvPicPr>
-            <a:picLocks noChangeAspect="1"/>
-          </p:cNvPicPr>
-          <p:nvPr/>
-        </p:nvPicPr>
-        <p:blipFill rotWithShape="1">
-          <a:blip r:embed="rId2"/>
-          <a:srcRect l="17013" t="25820" r="70374" b="41862"/>
-          <a:stretch/>
-        </p:blipFill>
-        <p:spPr>
-          <a:xfrm>
-            <a:off x="2921396" y="4593206"/>
-            <a:ext cx="1096460" cy="936406"/>
-          </a:xfrm>
-          <a:prstGeom prst="rect">
-            <a:avLst/>
-          </a:prstGeom>
-        </p:spPr>
-      </p:pic>
-      <p:pic>
-        <p:nvPicPr>
-          <p:cNvPr id="31" name="Picture 30"/>
-          <p:cNvPicPr>
-            <a:picLocks noChangeAspect="1"/>
-          </p:cNvPicPr>
-          <p:nvPr/>
-        </p:nvPicPr>
-        <p:blipFill rotWithShape="1">
-          <a:blip r:embed="rId2"/>
-          <a:srcRect l="17013" t="25820" r="70374" b="41862"/>
-          <a:stretch/>
-        </p:blipFill>
-        <p:spPr>
-          <a:xfrm>
-            <a:off x="4161240" y="3458410"/>
-            <a:ext cx="1097393" cy="937204"/>
-          </a:xfrm>
-          <a:prstGeom prst="rect">
-            <a:avLst/>
-          </a:prstGeom>
-        </p:spPr>
-      </p:pic>
-      <p:pic>
-        <p:nvPicPr>
-          <p:cNvPr id="32" name="Picture 31"/>
-          <p:cNvPicPr>
-            <a:picLocks noChangeAspect="1"/>
-          </p:cNvPicPr>
-          <p:nvPr/>
-        </p:nvPicPr>
-        <p:blipFill rotWithShape="1">
-          <a:blip r:embed="rId2"/>
-          <a:srcRect l="17013" t="25820" r="70374" b="41862"/>
-          <a:stretch/>
-        </p:blipFill>
-        <p:spPr>
-          <a:xfrm>
-            <a:off x="4161240" y="4593206"/>
-            <a:ext cx="1096460" cy="936406"/>
-          </a:xfrm>
-          <a:prstGeom prst="rect">
-            <a:avLst/>
-          </a:prstGeom>
-        </p:spPr>
-      </p:pic>
-      <p:pic>
-        <p:nvPicPr>
-          <p:cNvPr id="33" name="Picture 32"/>
-          <p:cNvPicPr>
-            <a:picLocks noChangeAspect="1"/>
-          </p:cNvPicPr>
-          <p:nvPr/>
-        </p:nvPicPr>
-        <p:blipFill rotWithShape="1">
-          <a:blip r:embed="rId2"/>
-          <a:srcRect l="17013" t="25820" r="70374" b="41862"/>
-          <a:stretch/>
-        </p:blipFill>
-        <p:spPr>
-          <a:xfrm>
-            <a:off x="5406201" y="3458410"/>
-            <a:ext cx="1097393" cy="937204"/>
-          </a:xfrm>
-          <a:prstGeom prst="rect">
-            <a:avLst/>
-          </a:prstGeom>
-        </p:spPr>
-      </p:pic>
-      <p:pic>
-        <p:nvPicPr>
-          <p:cNvPr id="34" name="Picture 33"/>
-          <p:cNvPicPr>
-            <a:picLocks noChangeAspect="1"/>
-          </p:cNvPicPr>
-          <p:nvPr/>
-        </p:nvPicPr>
-        <p:blipFill rotWithShape="1">
-          <a:blip r:embed="rId2"/>
-          <a:srcRect l="17013" t="25820" r="70374" b="41862"/>
-          <a:stretch/>
-        </p:blipFill>
-        <p:spPr>
-          <a:xfrm>
-            <a:off x="5406201" y="4593206"/>
-            <a:ext cx="1096460" cy="936406"/>
-          </a:xfrm>
-          <a:prstGeom prst="rect">
-            <a:avLst/>
-          </a:prstGeom>
-        </p:spPr>
-      </p:pic>
-      <p:pic>
-        <p:nvPicPr>
-          <p:cNvPr id="35" name="Picture 34"/>
-          <p:cNvPicPr>
-            <a:picLocks noChangeAspect="1"/>
-          </p:cNvPicPr>
-          <p:nvPr/>
-        </p:nvPicPr>
-        <p:blipFill rotWithShape="1">
-          <a:blip r:embed="rId2"/>
-          <a:srcRect l="17013" t="25820" r="70374" b="41862"/>
-          <a:stretch/>
-        </p:blipFill>
-        <p:spPr>
-          <a:xfrm>
-            <a:off x="6651162" y="3458410"/>
-            <a:ext cx="1097393" cy="937204"/>
-          </a:xfrm>
-          <a:prstGeom prst="rect">
-            <a:avLst/>
-          </a:prstGeom>
-        </p:spPr>
-      </p:pic>
-      <p:pic>
-        <p:nvPicPr>
-          <p:cNvPr id="36" name="Picture 35"/>
-          <p:cNvPicPr>
-            <a:picLocks noChangeAspect="1"/>
-          </p:cNvPicPr>
-          <p:nvPr/>
-        </p:nvPicPr>
-        <p:blipFill rotWithShape="1">
-          <a:blip r:embed="rId2"/>
-          <a:srcRect l="17013" t="25820" r="70374" b="41862"/>
-          <a:stretch/>
-        </p:blipFill>
-        <p:spPr>
-          <a:xfrm>
-            <a:off x="6651162" y="4593206"/>
-            <a:ext cx="1096460" cy="936406"/>
-          </a:xfrm>
-          <a:prstGeom prst="rect">
-            <a:avLst/>
-          </a:prstGeom>
-        </p:spPr>
-      </p:pic>
-      <p:pic>
-        <p:nvPicPr>
-          <p:cNvPr id="37" name="Picture 36"/>
-          <p:cNvPicPr>
-            <a:picLocks noChangeAspect="1"/>
-          </p:cNvPicPr>
-          <p:nvPr/>
-        </p:nvPicPr>
-        <p:blipFill rotWithShape="1">
-          <a:blip r:embed="rId2"/>
-          <a:srcRect l="17013" t="25820" r="70374" b="41862"/>
-          <a:stretch/>
-        </p:blipFill>
-        <p:spPr>
-          <a:xfrm>
-            <a:off x="7891006" y="3458410"/>
-            <a:ext cx="1097393" cy="937204"/>
-          </a:xfrm>
-          <a:prstGeom prst="rect">
-            <a:avLst/>
-          </a:prstGeom>
-        </p:spPr>
-      </p:pic>
-      <p:pic>
-        <p:nvPicPr>
-          <p:cNvPr id="38" name="Picture 37"/>
-          <p:cNvPicPr>
-            <a:picLocks noChangeAspect="1"/>
-          </p:cNvPicPr>
-          <p:nvPr/>
-        </p:nvPicPr>
-        <p:blipFill rotWithShape="1">
-          <a:blip r:embed="rId2"/>
-          <a:srcRect l="17013" t="25820" r="70374" b="41862"/>
-          <a:stretch/>
-        </p:blipFill>
-        <p:spPr>
-          <a:xfrm>
-            <a:off x="7891006" y="4593206"/>
-            <a:ext cx="1096460" cy="936406"/>
-          </a:xfrm>
-          <a:prstGeom prst="rect">
-            <a:avLst/>
-          </a:prstGeom>
-        </p:spPr>
-      </p:pic>
       <p:sp>
         <p:nvSpPr>
           <p:cNvPr id="41" name="Rectangle 40"/>
@@ -3709,7 +3328,7 @@
         </p:nvSpPr>
         <p:spPr>
           <a:xfrm>
-            <a:off x="1872580" y="4104520"/>
+            <a:off x="1847645" y="1275278"/>
             <a:ext cx="868973" cy="191033"/>
           </a:xfrm>
           <a:prstGeom prst="rect">
@@ -3754,7 +3373,7 @@
         </p:nvSpPr>
         <p:spPr>
           <a:xfrm>
-            <a:off x="1195168" y="3681725"/>
+            <a:off x="1170233" y="852483"/>
             <a:ext cx="1382366" cy="1754326"/>
           </a:xfrm>
           <a:prstGeom prst="rect">
@@ -3907,16 +3526,39 @@
           </a:p>
         </p:txBody>
       </p:sp>
-      <p:sp>
-        <p:nvSpPr>
-          <p:cNvPr id="45" name="Rectangle 44"/>
+      <p:pic>
+        <p:nvPicPr>
+          <p:cNvPr id="2" name="Picture 1"/>
+          <p:cNvPicPr>
+            <a:picLocks noChangeAspect="1"/>
+          </p:cNvPicPr>
+          <p:nvPr/>
+        </p:nvPicPr>
+        <p:blipFill rotWithShape="1">
+          <a:blip r:embed="rId3"/>
+          <a:srcRect l="9377" t="28276" r="60455" b="28562"/>
+          <a:stretch/>
+        </p:blipFill>
+        <p:spPr>
+          <a:xfrm>
+            <a:off x="2818404" y="3485702"/>
+            <a:ext cx="6447238" cy="3074757"/>
+          </a:xfrm>
+          <a:prstGeom prst="rect">
+            <a:avLst/>
+          </a:prstGeom>
+        </p:spPr>
+      </p:pic>
+      <p:sp>
+        <p:nvSpPr>
+          <p:cNvPr id="39" name="Rectangle 38"/>
           <p:cNvSpPr/>
           <p:nvPr/>
         </p:nvSpPr>
         <p:spPr>
           <a:xfrm>
-            <a:off x="2818404" y="3242391"/>
-            <a:ext cx="6492173" cy="45719"/>
+            <a:off x="2818404" y="3249646"/>
+            <a:ext cx="976356" cy="135216"/>
           </a:xfrm>
           <a:prstGeom prst="rect">
             <a:avLst/>
@@ -3939,11 +3581,375 @@
           </a:fontRef>
         </p:style>
         <p:txBody>
-          <a:bodyPr rtlCol="0" anchor="t"/>
+          <a:bodyPr rtlCol="0" anchor="ctr"/>
           <a:lstStyle/>
           <a:p>
             <a:pPr algn="ctr"/>
-            <a:endParaRPr lang="en-US" dirty="0">
+            <a:r>
+              <a:rPr lang="en-US" sz="1200" dirty="0" smtClean="0">
+                <a:solidFill>
+                  <a:schemeClr val="tx1"/>
+                </a:solidFill>
+              </a:rPr>
+              <a:t>Textures</a:t>
+            </a:r>
+            <a:endParaRPr lang="en-US" sz="1200" dirty="0">
+              <a:solidFill>
+                <a:schemeClr val="tx1"/>
+              </a:solidFill>
+            </a:endParaRPr>
+          </a:p>
+        </p:txBody>
+      </p:sp>
+      <p:sp>
+        <p:nvSpPr>
+          <p:cNvPr id="42" name="Rectangle 41"/>
+          <p:cNvSpPr/>
+          <p:nvPr/>
+        </p:nvSpPr>
+        <p:spPr>
+          <a:xfrm>
+            <a:off x="3794760" y="3249646"/>
+            <a:ext cx="976356" cy="135216"/>
+          </a:xfrm>
+          <a:prstGeom prst="rect">
+            <a:avLst/>
+          </a:prstGeom>
+        </p:spPr>
+        <p:style>
+          <a:lnRef idx="2">
+            <a:schemeClr val="accent3">
+              <a:shade val="50000"/>
+            </a:schemeClr>
+          </a:lnRef>
+          <a:fillRef idx="1">
+            <a:schemeClr val="accent3"/>
+          </a:fillRef>
+          <a:effectRef idx="0">
+            <a:schemeClr val="accent3"/>
+          </a:effectRef>
+          <a:fontRef idx="minor">
+            <a:schemeClr val="lt1"/>
+          </a:fontRef>
+        </p:style>
+        <p:txBody>
+          <a:bodyPr rtlCol="0" anchor="ctr"/>
+          <a:lstStyle/>
+          <a:p>
+            <a:pPr algn="ctr"/>
+            <a:r>
+              <a:rPr lang="en-US" sz="1200" dirty="0" smtClean="0">
+                <a:solidFill>
+                  <a:schemeClr val="tx1"/>
+                </a:solidFill>
+              </a:rPr>
+              <a:t>Building</a:t>
+            </a:r>
+            <a:endParaRPr lang="en-US" sz="1200" dirty="0">
+              <a:solidFill>
+                <a:schemeClr val="tx1"/>
+              </a:solidFill>
+            </a:endParaRPr>
+          </a:p>
+        </p:txBody>
+      </p:sp>
+      <p:sp>
+        <p:nvSpPr>
+          <p:cNvPr id="14" name="Rectangle 13"/>
+          <p:cNvSpPr/>
+          <p:nvPr/>
+        </p:nvSpPr>
+        <p:spPr>
+          <a:xfrm>
+            <a:off x="3817620" y="3550920"/>
+            <a:ext cx="708660" cy="716280"/>
+          </a:xfrm>
+          <a:prstGeom prst="rect">
+            <a:avLst/>
+          </a:prstGeom>
+          <a:noFill/>
+          <a:ln w="50800">
+            <a:solidFill>
+              <a:srgbClr val="C00000"/>
+            </a:solidFill>
+          </a:ln>
+        </p:spPr>
+        <p:style>
+          <a:lnRef idx="2">
+            <a:schemeClr val="accent1">
+              <a:shade val="50000"/>
+            </a:schemeClr>
+          </a:lnRef>
+          <a:fillRef idx="1">
+            <a:schemeClr val="accent1"/>
+          </a:fillRef>
+          <a:effectRef idx="0">
+            <a:schemeClr val="accent1"/>
+          </a:effectRef>
+          <a:fontRef idx="minor">
+            <a:schemeClr val="lt1"/>
+          </a:fontRef>
+        </p:style>
+        <p:txBody>
+          <a:bodyPr rtlCol="0" anchor="ctr"/>
+          <a:lstStyle/>
+          <a:p>
+            <a:pPr algn="ctr"/>
+            <a:endParaRPr lang="en-US"/>
+          </a:p>
+        </p:txBody>
+      </p:sp>
+      <p:pic>
+        <p:nvPicPr>
+          <p:cNvPr id="43" name="Picture 42"/>
+          <p:cNvPicPr>
+            <a:picLocks noChangeAspect="1"/>
+          </p:cNvPicPr>
+          <p:nvPr/>
+        </p:nvPicPr>
+        <p:blipFill rotWithShape="1">
+          <a:blip r:embed="rId3"/>
+          <a:srcRect l="9710" t="29086" r="86803" b="60434"/>
+          <a:stretch/>
+        </p:blipFill>
+        <p:spPr>
+          <a:xfrm>
+            <a:off x="5761519" y="1275278"/>
+            <a:ext cx="745321" cy="746645"/>
+          </a:xfrm>
+          <a:prstGeom prst="rect">
+            <a:avLst/>
+          </a:prstGeom>
+        </p:spPr>
+      </p:pic>
+      <p:pic>
+        <p:nvPicPr>
+          <p:cNvPr id="44" name="Picture 43"/>
+          <p:cNvPicPr>
+            <a:picLocks noChangeAspect="1"/>
+          </p:cNvPicPr>
+          <p:nvPr/>
+        </p:nvPicPr>
+        <p:blipFill rotWithShape="1">
+          <a:blip r:embed="rId3"/>
+          <a:srcRect l="13981" t="29084" r="82525" b="60433"/>
+          <a:stretch/>
+        </p:blipFill>
+        <p:spPr>
+          <a:xfrm>
+            <a:off x="6631278" y="1275220"/>
+            <a:ext cx="746760" cy="746760"/>
+          </a:xfrm>
+          <a:prstGeom prst="rect">
+            <a:avLst/>
+          </a:prstGeom>
+        </p:spPr>
+      </p:pic>
+      <p:sp>
+        <p:nvSpPr>
+          <p:cNvPr id="17" name="TextBox 16"/>
+          <p:cNvSpPr txBox="1"/>
+          <p:nvPr/>
+        </p:nvSpPr>
+        <p:spPr>
+          <a:xfrm>
+            <a:off x="5761518" y="1744924"/>
+            <a:ext cx="745322" cy="276999"/>
+          </a:xfrm>
+          <a:prstGeom prst="rect">
+            <a:avLst/>
+          </a:prstGeom>
+          <a:noFill/>
+        </p:spPr>
+        <p:txBody>
+          <a:bodyPr wrap="square" rtlCol="0" anchor="b">
+            <a:spAutoFit/>
+          </a:bodyPr>
+          <a:lstStyle/>
+          <a:p>
+            <a:pPr algn="ctr"/>
+            <a:r>
+              <a:rPr lang="en-US" sz="1200" dirty="0" smtClean="0"/>
+              <a:t>Diffuse</a:t>
+            </a:r>
+            <a:endParaRPr lang="en-US" sz="1200" dirty="0"/>
+          </a:p>
+        </p:txBody>
+      </p:sp>
+      <p:sp>
+        <p:nvSpPr>
+          <p:cNvPr id="46" name="TextBox 45"/>
+          <p:cNvSpPr txBox="1"/>
+          <p:nvPr/>
+        </p:nvSpPr>
+        <p:spPr>
+          <a:xfrm>
+            <a:off x="6631277" y="1744923"/>
+            <a:ext cx="745322" cy="276999"/>
+          </a:xfrm>
+          <a:prstGeom prst="rect">
+            <a:avLst/>
+          </a:prstGeom>
+          <a:noFill/>
+        </p:spPr>
+        <p:txBody>
+          <a:bodyPr wrap="square" rtlCol="0" anchor="b">
+            <a:spAutoFit/>
+          </a:bodyPr>
+          <a:lstStyle/>
+          <a:p>
+            <a:pPr algn="ctr"/>
+            <a:r>
+              <a:rPr lang="en-US" sz="1200" dirty="0" smtClean="0"/>
+              <a:t>Normal</a:t>
+            </a:r>
+            <a:endParaRPr lang="en-US" sz="1200" dirty="0"/>
+          </a:p>
+        </p:txBody>
+      </p:sp>
+      <p:sp>
+        <p:nvSpPr>
+          <p:cNvPr id="47" name="Rectangle 46"/>
+          <p:cNvSpPr/>
+          <p:nvPr/>
+        </p:nvSpPr>
+        <p:spPr>
+          <a:xfrm>
+            <a:off x="6649608" y="1285942"/>
+            <a:ext cx="708660" cy="716280"/>
+          </a:xfrm>
+          <a:prstGeom prst="rect">
+            <a:avLst/>
+          </a:prstGeom>
+          <a:noFill/>
+          <a:ln w="50800">
+            <a:solidFill>
+              <a:srgbClr val="C00000"/>
+            </a:solidFill>
+          </a:ln>
+        </p:spPr>
+        <p:style>
+          <a:lnRef idx="2">
+            <a:schemeClr val="accent1">
+              <a:shade val="50000"/>
+            </a:schemeClr>
+          </a:lnRef>
+          <a:fillRef idx="1">
+            <a:schemeClr val="accent1"/>
+          </a:fillRef>
+          <a:effectRef idx="0">
+            <a:schemeClr val="accent1"/>
+          </a:effectRef>
+          <a:fontRef idx="minor">
+            <a:schemeClr val="lt1"/>
+          </a:fontRef>
+        </p:style>
+        <p:txBody>
+          <a:bodyPr rtlCol="0" anchor="ctr"/>
+          <a:lstStyle/>
+          <a:p>
+            <a:pPr algn="ctr"/>
+            <a:endParaRPr lang="en-US"/>
+          </a:p>
+        </p:txBody>
+      </p:sp>
+      <p:sp>
+        <p:nvSpPr>
+          <p:cNvPr id="48" name="Rectangle 47"/>
+          <p:cNvSpPr/>
+          <p:nvPr/>
+        </p:nvSpPr>
+        <p:spPr>
+          <a:xfrm>
+            <a:off x="7501037" y="1275248"/>
+            <a:ext cx="745322" cy="746674"/>
+          </a:xfrm>
+          <a:prstGeom prst="rect">
+            <a:avLst/>
+          </a:prstGeom>
+        </p:spPr>
+        <p:style>
+          <a:lnRef idx="2">
+            <a:schemeClr val="accent3">
+              <a:shade val="50000"/>
+            </a:schemeClr>
+          </a:lnRef>
+          <a:fillRef idx="1">
+            <a:schemeClr val="accent3"/>
+          </a:fillRef>
+          <a:effectRef idx="0">
+            <a:schemeClr val="accent3"/>
+          </a:effectRef>
+          <a:fontRef idx="minor">
+            <a:schemeClr val="lt1"/>
+          </a:fontRef>
+        </p:style>
+        <p:txBody>
+          <a:bodyPr rtlCol="0" anchor="b"/>
+          <a:lstStyle/>
+          <a:p>
+            <a:pPr algn="ctr"/>
+            <a:r>
+              <a:rPr lang="en-US" sz="1200" dirty="0" smtClean="0">
+                <a:solidFill>
+                  <a:schemeClr val="tx1"/>
+                </a:solidFill>
+              </a:rPr>
+              <a:t>Specular</a:t>
+            </a:r>
+            <a:endParaRPr lang="en-US" sz="1200" dirty="0">
+              <a:solidFill>
+                <a:schemeClr val="tx1"/>
+              </a:solidFill>
+            </a:endParaRPr>
+          </a:p>
+        </p:txBody>
+      </p:sp>
+      <p:sp>
+        <p:nvSpPr>
+          <p:cNvPr id="52" name="Rectangle 51"/>
+          <p:cNvSpPr/>
+          <p:nvPr/>
+        </p:nvSpPr>
+        <p:spPr>
+          <a:xfrm>
+            <a:off x="8367610" y="1285942"/>
+            <a:ext cx="745322" cy="746674"/>
+          </a:xfrm>
+          <a:prstGeom prst="rect">
+            <a:avLst/>
+          </a:prstGeom>
+        </p:spPr>
+        <p:style>
+          <a:lnRef idx="2">
+            <a:schemeClr val="accent3">
+              <a:shade val="50000"/>
+            </a:schemeClr>
+          </a:lnRef>
+          <a:fillRef idx="1">
+            <a:schemeClr val="accent3"/>
+          </a:fillRef>
+          <a:effectRef idx="0">
+            <a:schemeClr val="accent3"/>
+          </a:effectRef>
+          <a:fontRef idx="minor">
+            <a:schemeClr val="lt1"/>
+          </a:fontRef>
+        </p:style>
+        <p:txBody>
+          <a:bodyPr rtlCol="0" anchor="b"/>
+          <a:lstStyle/>
+          <a:p>
+            <a:pPr algn="ctr"/>
+            <a:r>
+              <a:rPr lang="en-US" sz="1200" dirty="0" smtClean="0">
+                <a:solidFill>
+                  <a:schemeClr val="tx1"/>
+                </a:solidFill>
+              </a:rPr>
+              <a:t>Bump</a:t>
+            </a:r>
+            <a:endParaRPr lang="en-US" sz="1200" dirty="0">
               <a:solidFill>
                 <a:schemeClr val="tx1"/>
               </a:solidFill>

</xml_diff>